<commit_message>
add new lecture note
</commit_message>
<xml_diff>
--- a/course/smt/LectureNotes/(Spring2016)Lecture6.pptx
+++ b/course/smt/LectureNotes/(Spring2016)Lecture6.pptx
@@ -154,7 +154,7 @@
   </p:defaultTextStyle>
   <p:extLst>
     <p:ext uri="{EFAFB233-063F-42B5-8137-9DF3F51BA10A}">
-      <p15:sldGuideLst xmlns:p15="http://schemas.microsoft.com/office/powerpoint/2012/main" xmlns="">
+      <p15:sldGuideLst xmlns:p15="http://schemas.microsoft.com/office/powerpoint/2012/main">
         <p15:guide id="1" orient="horz" pos="2160">
           <p15:clr>
             <a:srgbClr val="A4A3A4"/>
@@ -168,7 +168,7 @@
       </p15:sldGuideLst>
     </p:ext>
     <p:ext uri="{2D200454-40CA-4A62-9FC3-DE9A4176ACB9}">
-      <p15:notesGuideLst xmlns:p15="http://schemas.microsoft.com/office/powerpoint/2012/main" xmlns="">
+      <p15:notesGuideLst xmlns:p15="http://schemas.microsoft.com/office/powerpoint/2012/main">
         <p15:guide id="1" orient="horz" pos="2880">
           <p15:clr>
             <a:srgbClr val="A4A3A4"/>
@@ -268,7 +268,7 @@
             <a:fld id="{2447E72A-D913-4DC2-9E0A-E520CE8FCC86}" type="datetimeFigureOut">
               <a:rPr lang="en-US" smtClean="0"/>
               <a:pPr/>
-              <a:t>5/18/2016</a:t>
+              <a:t>5/25/2016</a:t>
             </a:fld>
             <a:endParaRPr lang="en-US"/>
           </a:p>
@@ -946,7 +946,7 @@
             <a:fld id="{743653DA-8BF4-4869-96FE-9BCF43372D46}" type="datetime8">
               <a:rPr lang="en-US" smtClean="0"/>
               <a:pPr algn="ctr"/>
-              <a:t>5/18/2016 8:13 PM</a:t>
+              <a:t>5/25/2016 10:26 AM</a:t>
             </a:fld>
             <a:endParaRPr lang="en-US" sz="2000" dirty="0">
               <a:solidFill>
@@ -1156,7 +1156,7 @@
                 </a:solidFill>
               </a:rPr>
               <a:pPr/>
-              <a:t>5/18/2016 8:13 PM</a:t>
+              <a:t>5/25/2016 10:26 AM</a:t>
             </a:fld>
             <a:endParaRPr lang="en-US"/>
           </a:p>
@@ -1346,7 +1346,7 @@
                 </a:solidFill>
               </a:rPr>
               <a:pPr/>
-              <a:t>5/18/2016 8:13 PM</a:t>
+              <a:t>5/25/2016 10:26 AM</a:t>
             </a:fld>
             <a:endParaRPr lang="en-US" dirty="0"/>
           </a:p>
@@ -1615,7 +1615,7 @@
             <a:fld id="{B7129108-AC8D-4212-9283-60D9E99BF07A}" type="datetime8">
               <a:rPr lang="en-US" smtClean="0"/>
               <a:pPr/>
-              <a:t>5/18/2016 8:13 PM</a:t>
+              <a:t>5/25/2016 10:26 AM</a:t>
             </a:fld>
             <a:endParaRPr lang="en-US" dirty="0"/>
           </a:p>
@@ -2032,7 +2032,7 @@
             <a:fld id="{B6DED3D3-6235-4F4C-B439-DF277FB555A7}" type="datetime8">
               <a:rPr lang="en-US" smtClean="0"/>
               <a:pPr/>
-              <a:t>5/18/2016 8:13 PM</a:t>
+              <a:t>5/25/2016 10:26 AM</a:t>
             </a:fld>
             <a:endParaRPr lang="en-US"/>
           </a:p>
@@ -2281,7 +2281,7 @@
             <a:fld id="{3B5F1E3E-4B2F-4895-B65E-28B2E64F39F6}" type="datetime8">
               <a:rPr lang="en-US" smtClean="0"/>
               <a:pPr/>
-              <a:t>5/18/2016 8:13 PM</a:t>
+              <a:t>5/25/2016 10:26 AM</a:t>
             </a:fld>
             <a:endParaRPr lang="en-US"/>
           </a:p>
@@ -2520,7 +2520,7 @@
             <a:fld id="{63085435-8225-4333-BFFA-0096413F0D76}" type="datetime8">
               <a:rPr lang="en-US" smtClean="0"/>
               <a:pPr/>
-              <a:t>5/18/2016 8:13 PM</a:t>
+              <a:t>5/25/2016 10:26 AM</a:t>
             </a:fld>
             <a:endParaRPr lang="en-US"/>
           </a:p>
@@ -2718,7 +2718,7 @@
             <a:fld id="{0783C494-2A87-468C-A21B-CB14FB9ABB00}" type="datetime8">
               <a:rPr lang="en-US" smtClean="0"/>
               <a:pPr/>
-              <a:t>5/18/2016 8:13 PM</a:t>
+              <a:t>5/25/2016 10:26 AM</a:t>
             </a:fld>
             <a:endParaRPr lang="en-US"/>
           </a:p>
@@ -2822,7 +2822,7 @@
             <a:fld id="{9A180FA0-5B31-4864-A2BB-719EA5A679C6}" type="datetime8">
               <a:rPr lang="en-US" smtClean="0"/>
               <a:pPr/>
-              <a:t>5/18/2016 8:13 PM</a:t>
+              <a:t>5/25/2016 10:26 AM</a:t>
             </a:fld>
             <a:endParaRPr lang="en-US"/>
           </a:p>
@@ -2964,7 +2964,7 @@
             <a:fld id="{4BECC0C8-36B8-442A-833D-B6AACE86BB77}" type="datetime8">
               <a:rPr lang="en-US" smtClean="0"/>
               <a:pPr/>
-              <a:t>5/18/2016 8:13 PM</a:t>
+              <a:t>5/25/2016 10:26 AM</a:t>
             </a:fld>
             <a:endParaRPr lang="en-US"/>
           </a:p>
@@ -3439,7 +3439,7 @@
             <a:fld id="{51E20EC5-AC53-4169-941E-EDF10CD23748}" type="datetime8">
               <a:rPr lang="en-US" smtClean="0"/>
               <a:pPr/>
-              <a:t>5/18/2016 8:13 PM</a:t>
+              <a:t>5/25/2016 10:26 AM</a:t>
             </a:fld>
             <a:endParaRPr lang="en-US"/>
           </a:p>
@@ -3707,7 +3707,7 @@
                 </a:solidFill>
               </a:rPr>
               <a:pPr/>
-              <a:t>5/18/2016 8:13 PM</a:t>
+              <a:t>5/25/2016 10:26 AM</a:t>
             </a:fld>
             <a:endParaRPr lang="en-US" sz="1400" dirty="0">
               <a:solidFill>
@@ -4306,7 +4306,7 @@
               <a:t>软件建模训练</a:t>
             </a:r>
             <a:r>
-              <a:rPr lang="en-US" altLang="zh-CN" dirty="0" smtClean="0">
+              <a:rPr lang="en-US" altLang="zh-CN" smtClean="0">
                 <a:solidFill>
                   <a:srgbClr val="3891A7">
                     <a:lumMod val="75000"/>
@@ -4315,7 +4315,7 @@
                 <a:latin typeface="Tw Cen MT"/>
                 <a:ea typeface="宋体" pitchFamily="2" charset="-122"/>
               </a:rPr>
-              <a:t>(5)</a:t>
+              <a:t>(6)</a:t>
             </a:r>
             <a:r>
               <a:rPr lang="zh-CN" altLang="en-US" sz="3600" b="0" i="0" dirty="0" smtClean="0">
@@ -22601,7 +22601,6 @@
               <a:rPr lang="zh-CN" altLang="en-US" dirty="0"/>
               <a:t>连接件：过程调用或直接存储器访问</a:t>
             </a:r>
-            <a:endParaRPr lang="zh-CN" altLang="en-US" dirty="0"/>
           </a:p>
         </p:txBody>
       </p:sp>
@@ -27698,7 +27697,6 @@
               <a:rPr lang="zh-CN" altLang="en-US" dirty="0"/>
               <a:t>人工智能领域：专家系统（在某个领域内具有专家水平解题能力的系统；由一个专门领域的知识库，以及一个能获取和运用知识的机构构成的解题程序系统）</a:t>
             </a:r>
-            <a:endParaRPr lang="zh-CN" altLang="en-US" dirty="0"/>
           </a:p>
         </p:txBody>
       </p:sp>

</xml_diff>